<commit_message>
Update: some attempts on simulating the convex mirrors.
Also some updates on the thermal deformation
</commit_message>
<xml_diff>
--- a/06-03-21_Meeting.pptx
+++ b/06-03-21_Meeting.pptx
@@ -22,6 +22,7 @@
     <p:sldId id="277" r:id="rId16"/>
     <p:sldId id="278" r:id="rId17"/>
     <p:sldId id="279" r:id="rId18"/>
+    <p:sldId id="285" r:id="rId19"/>
   </p:sldIdLst>
   <p:sldSz cx="12192000" cy="6858000"/>
   <p:notesSz cx="6858000" cy="9144000"/>
@@ -146,6 +147,7 @@
             <p14:sldId id="277"/>
             <p14:sldId id="278"/>
             <p14:sldId id="279"/>
+            <p14:sldId id="285"/>
           </p14:sldIdLst>
         </p14:section>
       </p14:sectionLst>
@@ -3653,7 +3655,7 @@
           <p:nvPr>
             <p:extLst>
               <p:ext uri="{D42A27DB-BD31-4B8C-83A1-F6EECF244321}">
-                <p14:modId xmlns:p14="http://schemas.microsoft.com/office/powerpoint/2010/main" val="3313777021"/>
+                <p14:modId xmlns:p14="http://schemas.microsoft.com/office/powerpoint/2010/main" val="3920908531"/>
               </p:ext>
             </p:extLst>
           </p:nvPr>
@@ -3748,12 +3750,12 @@
                     <a:p>
                       <a:pPr algn="l" fontAlgn="b"/>
                       <a:r>
-                        <a:rPr lang="en-US" sz="1100" u="none" strike="noStrike">
-                          <a:effectLst/>
-                        </a:rPr>
-                        <a:t>100 fs Open</a:t>
-                      </a:r>
-                      <a:endParaRPr lang="en-US" sz="1100" b="0" i="0" u="none" strike="noStrike">
+                        <a:rPr lang="en-US" sz="1100" u="none" strike="noStrike" dirty="0">
+                          <a:effectLst/>
+                        </a:rPr>
+                        <a:t>200 fs Open</a:t>
+                      </a:r>
+                      <a:endParaRPr lang="en-US" sz="1100" b="0" i="0" u="none" strike="noStrike" dirty="0">
                         <a:solidFill>
                           <a:srgbClr val="000000"/>
                         </a:solidFill>
@@ -9556,12 +9558,72 @@
         </p:nvSpPr>
         <p:spPr/>
         <p:txBody>
-          <a:bodyPr/>
+          <a:bodyPr>
+            <a:normAutofit fontScale="77500" lnSpcReduction="20000"/>
+          </a:bodyPr>
           <a:lstStyle/>
           <a:p>
             <a:r>
               <a:rPr lang="en-US" altLang="zh-CN" dirty="0"/>
               <a:t>Slope error simulation (need help from Matt)</a:t>
+            </a:r>
+          </a:p>
+          <a:p>
+            <a:r>
+              <a:rPr lang="en-US" altLang="zh-CN" dirty="0"/>
+              <a:t>Total flux across diff cases/optics (# photon per pulse); transmission</a:t>
+            </a:r>
+          </a:p>
+          <a:p>
+            <a:r>
+              <a:rPr lang="en-US" altLang="zh-CN" dirty="0"/>
+              <a:t>Deviation from Gaussian; Fit to </a:t>
+            </a:r>
+            <a:r>
+              <a:rPr lang="en-US" altLang="zh-CN" dirty="0" err="1"/>
+              <a:t>Pseudovoigt</a:t>
+            </a:r>
+            <a:r>
+              <a:rPr lang="en-US" altLang="zh-CN" dirty="0"/>
+              <a:t> function (linear combination of Gaussian and Lorentzian)</a:t>
+            </a:r>
+          </a:p>
+          <a:p>
+            <a:pPr lvl="1"/>
+            <a:r>
+              <a:rPr lang="en-US" altLang="zh-CN" dirty="0"/>
+              <a:t>Time and energy domain are not necessarily correlated when not near transform limit. Analyze separately (there could be pedestal in time).</a:t>
+            </a:r>
+          </a:p>
+          <a:p>
+            <a:r>
+              <a:rPr lang="en-US" altLang="zh-CN" dirty="0"/>
+              <a:t>SASE?</a:t>
+            </a:r>
+          </a:p>
+          <a:p>
+            <a:endParaRPr lang="en-US" altLang="zh-CN" dirty="0"/>
+          </a:p>
+          <a:p>
+            <a:r>
+              <a:rPr lang="en-US" altLang="zh-CN" dirty="0"/>
+              <a:t>Comparison between SRW and Matt’s code at each optics</a:t>
+            </a:r>
+          </a:p>
+          <a:p>
+            <a:r>
+              <a:rPr lang="en-US" altLang="zh-CN" dirty="0"/>
+              <a:t>100fs for periscope + HHLM+HRM (The output of FEE can be simulated separately and loaded afterwards). The periscope mirrors are defocusing-focusing mirrors in x. (~30nrad collimation)</a:t>
+            </a:r>
+          </a:p>
+          <a:p>
+            <a:r>
+              <a:rPr lang="en-US" altLang="zh-CN" dirty="0"/>
+              <a:t>For the optics, don’t simulate the whole thing, just simulate the segments and archive </a:t>
+            </a:r>
+            <a:r>
+              <a:rPr lang="en-US" altLang="zh-CN"/>
+              <a:t>the outputs.</a:t>
             </a:r>
             <a:endParaRPr lang="zh-CN" altLang="en-US" dirty="0"/>
           </a:p>
@@ -9571,6 +9633,137 @@
     <p:extLst>
       <p:ext uri="{BB962C8B-B14F-4D97-AF65-F5344CB8AC3E}">
         <p14:creationId xmlns:p14="http://schemas.microsoft.com/office/powerpoint/2010/main" val="3420381543"/>
+      </p:ext>
+    </p:extLst>
+  </p:cSld>
+  <p:clrMapOvr>
+    <a:masterClrMapping/>
+  </p:clrMapOvr>
+</p:sld>
+</file>
+
+<file path=ppt/slides/slide18.xml><?xml version="1.0" encoding="utf-8"?>
+<p:sld xmlns:a="http://schemas.openxmlformats.org/drawingml/2006/main" xmlns:r="http://schemas.openxmlformats.org/officeDocument/2006/relationships" xmlns:p="http://schemas.openxmlformats.org/presentationml/2006/main">
+  <p:cSld>
+    <p:spTree>
+      <p:nvGrpSpPr>
+        <p:cNvPr id="1" name=""/>
+        <p:cNvGrpSpPr/>
+        <p:nvPr/>
+      </p:nvGrpSpPr>
+      <p:grpSpPr>
+        <a:xfrm>
+          <a:off x="0" y="0"/>
+          <a:ext cx="0" cy="0"/>
+          <a:chOff x="0" y="0"/>
+          <a:chExt cx="0" cy="0"/>
+        </a:xfrm>
+      </p:grpSpPr>
+      <p:sp>
+        <p:nvSpPr>
+          <p:cNvPr id="2" name="标题 1">
+            <a:extLst>
+              <a:ext uri="{FF2B5EF4-FFF2-40B4-BE49-F238E27FC236}">
+                <a16:creationId xmlns:a16="http://schemas.microsoft.com/office/drawing/2014/main" id="{6BB73BE5-4BD5-4EB9-9004-DD685C935561}"/>
+              </a:ext>
+            </a:extLst>
+          </p:cNvPr>
+          <p:cNvSpPr>
+            <a:spLocks noGrp="1"/>
+          </p:cNvSpPr>
+          <p:nvPr>
+            <p:ph type="title"/>
+          </p:nvPr>
+        </p:nvSpPr>
+        <p:spPr/>
+        <p:txBody>
+          <a:bodyPr/>
+          <a:lstStyle/>
+          <a:p>
+            <a:r>
+              <a:rPr lang="en-US" altLang="zh-CN" dirty="0"/>
+              <a:t>Loading arbitrary pulse in SRW</a:t>
+            </a:r>
+            <a:endParaRPr lang="zh-CN" altLang="en-US" dirty="0"/>
+          </a:p>
+        </p:txBody>
+      </p:sp>
+      <p:pic>
+        <p:nvPicPr>
+          <p:cNvPr id="5" name="图片 4" descr="图表&#10;&#10;描述已自动生成">
+            <a:extLst>
+              <a:ext uri="{FF2B5EF4-FFF2-40B4-BE49-F238E27FC236}">
+                <a16:creationId xmlns:a16="http://schemas.microsoft.com/office/drawing/2014/main" id="{6C0C73B2-A749-4CB8-A1F5-32AEDB1C944E}"/>
+              </a:ext>
+            </a:extLst>
+          </p:cNvPr>
+          <p:cNvPicPr>
+            <a:picLocks noChangeAspect="1"/>
+          </p:cNvPicPr>
+          <p:nvPr/>
+        </p:nvPicPr>
+        <p:blipFill>
+          <a:blip r:embed="rId2">
+            <a:extLst>
+              <a:ext uri="{28A0092B-C50C-407E-A947-70E740481C1C}">
+                <a14:useLocalDpi xmlns:a14="http://schemas.microsoft.com/office/drawing/2010/main" val="0"/>
+              </a:ext>
+            </a:extLst>
+          </a:blip>
+          <a:stretch>
+            <a:fillRect/>
+          </a:stretch>
+        </p:blipFill>
+        <p:spPr>
+          <a:xfrm>
+            <a:off x="0" y="1636059"/>
+            <a:ext cx="12192000" cy="3585882"/>
+          </a:xfrm>
+          <a:prstGeom prst="rect">
+            <a:avLst/>
+          </a:prstGeom>
+        </p:spPr>
+      </p:pic>
+      <p:sp>
+        <p:nvSpPr>
+          <p:cNvPr id="6" name="文本框 5">
+            <a:extLst>
+              <a:ext uri="{FF2B5EF4-FFF2-40B4-BE49-F238E27FC236}">
+                <a16:creationId xmlns:a16="http://schemas.microsoft.com/office/drawing/2014/main" id="{104E27CB-AB5B-4C21-8659-820BEE429033}"/>
+              </a:ext>
+            </a:extLst>
+          </p:cNvPr>
+          <p:cNvSpPr txBox="1"/>
+          <p:nvPr/>
+        </p:nvSpPr>
+        <p:spPr>
+          <a:xfrm>
+            <a:off x="1917057" y="5467350"/>
+            <a:ext cx="8357886" cy="646331"/>
+          </a:xfrm>
+          <a:prstGeom prst="rect">
+            <a:avLst/>
+          </a:prstGeom>
+          <a:noFill/>
+        </p:spPr>
+        <p:txBody>
+          <a:bodyPr wrap="square" rtlCol="0">
+            <a:spAutoFit/>
+          </a:bodyPr>
+          <a:lstStyle/>
+          <a:p>
+            <a:r>
+              <a:rPr lang="en-US" altLang="zh-CN" dirty="0"/>
+              <a:t>Tried loading an arbitrary pulse into SRW, dimension 256 x 256 x 8192, haven’t tried propagating this yet but NERSC seems to be happy with the pulse for now.</a:t>
+            </a:r>
+            <a:endParaRPr lang="zh-CN" altLang="en-US" dirty="0"/>
+          </a:p>
+        </p:txBody>
+      </p:sp>
+    </p:spTree>
+    <p:extLst>
+      <p:ext uri="{BB962C8B-B14F-4D97-AF65-F5344CB8AC3E}">
+        <p14:creationId xmlns:p14="http://schemas.microsoft.com/office/powerpoint/2010/main" val="291215526"/>
       </p:ext>
     </p:extLst>
   </p:cSld>
@@ -9983,12 +10176,12 @@
                     <a:p>
                       <a:pPr algn="l" fontAlgn="b"/>
                       <a:r>
-                        <a:rPr lang="en-US" sz="1100" u="none" strike="noStrike">
+                        <a:rPr lang="en-US" sz="1100" u="none" strike="noStrike" dirty="0">
                           <a:effectLst/>
                         </a:rPr>
                         <a:t>Full width (um)</a:t>
                       </a:r>
-                      <a:endParaRPr lang="en-US" sz="1100" b="0" i="0" u="none" strike="noStrike">
+                      <a:endParaRPr lang="en-US" sz="1100" b="0" i="0" u="none" strike="noStrike" dirty="0">
                         <a:solidFill>
                           <a:srgbClr val="000000"/>
                         </a:solidFill>
@@ -11471,12 +11664,12 @@
                     <a:p>
                       <a:pPr algn="r" fontAlgn="b"/>
                       <a:r>
-                        <a:rPr lang="en-US" altLang="zh-CN" sz="1100" u="none" strike="noStrike">
+                        <a:rPr lang="en-US" altLang="zh-CN" sz="1100" u="none" strike="noStrike" dirty="0">
                           <a:effectLst/>
                         </a:rPr>
                         <a:t>7</a:t>
                       </a:r>
-                      <a:endParaRPr lang="en-US" altLang="zh-CN" sz="1100" b="0" i="0" u="none" strike="noStrike">
+                      <a:endParaRPr lang="en-US" altLang="zh-CN" sz="1100" b="0" i="0" u="none" strike="noStrike" dirty="0">
                         <a:solidFill>
                           <a:srgbClr val="000000"/>
                         </a:solidFill>

</xml_diff>